<commit_message>
Ajout intro diapo soutenance
</commit_message>
<xml_diff>
--- a/Rendu/Diapo_demo_et_choixTechniques.pptx
+++ b/Rendu/Diapo_demo_et_choixTechniques.pptx
@@ -114,7 +114,7 @@
   </p:defaultTextStyle>
   <p:extLst>
     <p:ext uri="{EFAFB233-063F-42B5-8137-9DF3F51BA10A}">
-      <p15:sldGuideLst xmlns:p15="http://schemas.microsoft.com/office/powerpoint/2012/main" xmlns="">
+      <p15:sldGuideLst xmlns="" xmlns:p15="http://schemas.microsoft.com/office/powerpoint/2012/main">
         <p15:guide id="1" orient="horz" pos="1620">
           <p15:clr>
             <a:srgbClr val="A4A3A4"/>
@@ -6967,7 +6967,7 @@
           <p:nvPr>
             <p:extLst>
               <p:ext uri="{D42A27DB-BD31-4B8C-83A1-F6EECF244321}">
-                <p14:modId xmlns:p14="http://schemas.microsoft.com/office/powerpoint/2010/main" val="2396055097"/>
+                <p14:modId xmlns:p14="http://schemas.microsoft.com/office/powerpoint/2010/main" val="2441717875"/>
               </p:ext>
             </p:extLst>
           </p:nvPr>
@@ -7090,16 +7090,8 @@
                     </a:p>
                     <a:p>
                       <a:r>
-                        <a:rPr lang="fr-FR" sz="2400" dirty="0" smtClean="0"/>
-                        <a:t>WPF,</a:t>
-                      </a:r>
-                      <a:r>
                         <a:rPr lang="fr-FR" sz="2400" baseline="0" dirty="0" smtClean="0"/>
-                        <a:t> </a:t>
-                      </a:r>
-                      <a:r>
-                        <a:rPr lang="fr-FR" sz="2400" baseline="0" dirty="0" err="1" smtClean="0"/>
-                        <a:t>XaML</a:t>
+                        <a:t>   XAML</a:t>
                       </a:r>
                       <a:endParaRPr lang="fr-FR" sz="2400" dirty="0"/>
                     </a:p>

</xml_diff>